<commit_message>
Feat: Enhance annotation tool with zoom support during labeling.
</commit_message>
<xml_diff>
--- a/Keypoint-Annotation-Tool/使用手冊.pptx
+++ b/Keypoint-Annotation-Tool/使用手冊.pptx
@@ -5,7 +5,7 @@
     <p:sldMasterId id="2147483658" r:id="rId1"/>
   </p:sldMasterIdLst>
   <p:notesMasterIdLst>
-    <p:notesMasterId r:id="rId11"/>
+    <p:notesMasterId r:id="rId12"/>
   </p:notesMasterIdLst>
   <p:sldIdLst>
     <p:sldId id="312" r:id="rId2"/>
@@ -17,6 +17,7 @@
     <p:sldId id="462" r:id="rId8"/>
     <p:sldId id="463" r:id="rId9"/>
     <p:sldId id="464" r:id="rId10"/>
+    <p:sldId id="465" r:id="rId11"/>
   </p:sldIdLst>
   <p:sldSz cx="9144000" cy="5143500" type="screen16x9"/>
   <p:notesSz cx="7104063" cy="10234613"/>
@@ -881,6 +882,117 @@
     <p:extLst>
       <p:ext uri="{BB962C8B-B14F-4D97-AF65-F5344CB8AC3E}">
         <p14:creationId xmlns:p14="http://schemas.microsoft.com/office/powerpoint/2010/main" val="1251592749"/>
+      </p:ext>
+    </p:extLst>
+  </p:cSld>
+  <p:clrMapOvr>
+    <a:masterClrMapping/>
+  </p:clrMapOvr>
+</p:notes>
+</file>
+
+<file path=ppt/notesSlides/notesSlide10.xml><?xml version="1.0" encoding="utf-8"?>
+<p:notes xmlns:a="http://schemas.openxmlformats.org/drawingml/2006/main" xmlns:r="http://schemas.openxmlformats.org/officeDocument/2006/relationships" xmlns:p="http://schemas.openxmlformats.org/presentationml/2006/main" showMasterSp="0" showMasterPhAnim="0">
+  <p:cSld>
+    <p:spTree>
+      <p:nvGrpSpPr>
+        <p:cNvPr id="1" name="Shape 666"/>
+        <p:cNvGrpSpPr/>
+        <p:nvPr/>
+      </p:nvGrpSpPr>
+      <p:grpSpPr>
+        <a:xfrm>
+          <a:off x="0" y="0"/>
+          <a:ext cx="0" cy="0"/>
+          <a:chOff x="0" y="0"/>
+          <a:chExt cx="0" cy="0"/>
+        </a:xfrm>
+      </p:grpSpPr>
+      <p:sp>
+        <p:nvSpPr>
+          <p:cNvPr id="667" name="Google Shape;667;ge3de3d8929_0_97:notes"/>
+          <p:cNvSpPr>
+            <a:spLocks noGrp="1" noRot="1" noChangeAspect="1"/>
+          </p:cNvSpPr>
+          <p:nvPr>
+            <p:ph type="sldImg" idx="2"/>
+          </p:nvPr>
+        </p:nvSpPr>
+        <p:spPr>
+          <a:xfrm>
+            <a:off x="141288" y="768350"/>
+            <a:ext cx="6821487" cy="3836988"/>
+          </a:xfrm>
+          <a:custGeom>
+            <a:avLst/>
+            <a:gdLst/>
+            <a:ahLst/>
+            <a:cxnLst/>
+            <a:rect l="l" t="t" r="r" b="b"/>
+            <a:pathLst>
+              <a:path w="120000" h="120000" extrusionOk="0">
+                <a:moveTo>
+                  <a:pt x="0" y="0"/>
+                </a:moveTo>
+                <a:lnTo>
+                  <a:pt x="120000" y="0"/>
+                </a:lnTo>
+                <a:lnTo>
+                  <a:pt x="120000" y="120000"/>
+                </a:lnTo>
+                <a:lnTo>
+                  <a:pt x="0" y="120000"/>
+                </a:lnTo>
+                <a:close/>
+              </a:path>
+            </a:pathLst>
+          </a:custGeom>
+        </p:spPr>
+      </p:sp>
+      <p:sp>
+        <p:nvSpPr>
+          <p:cNvPr id="668" name="Google Shape;668;ge3de3d8929_0_97:notes"/>
+          <p:cNvSpPr txBox="1">
+            <a:spLocks noGrp="1"/>
+          </p:cNvSpPr>
+          <p:nvPr>
+            <p:ph type="body" idx="1"/>
+          </p:nvPr>
+        </p:nvSpPr>
+        <p:spPr>
+          <a:xfrm>
+            <a:off x="710407" y="4861442"/>
+            <a:ext cx="5683250" cy="4605576"/>
+          </a:xfrm>
+          <a:prstGeom prst="rect">
+            <a:avLst/>
+          </a:prstGeom>
+        </p:spPr>
+        <p:txBody>
+          <a:bodyPr spcFirstLastPara="1" wrap="square" lIns="99067" tIns="99067" rIns="99067" bIns="99067" anchor="t" anchorCtr="0">
+            <a:noAutofit/>
+          </a:bodyPr>
+          <a:lstStyle/>
+          <a:p>
+            <a:pPr marL="0" indent="0">
+              <a:buNone/>
+            </a:pPr>
+            <a:endParaRPr sz="1500" b="1" dirty="0">
+              <a:solidFill>
+                <a:schemeClr val="dk1"/>
+              </a:solidFill>
+              <a:latin typeface="Microsoft JhengHei"/>
+              <a:ea typeface="Microsoft JhengHei"/>
+              <a:cs typeface="Microsoft JhengHei"/>
+              <a:sym typeface="Microsoft JhengHei"/>
+            </a:endParaRPr>
+          </a:p>
+        </p:txBody>
+      </p:sp>
+    </p:spTree>
+    <p:extLst>
+      <p:ext uri="{BB962C8B-B14F-4D97-AF65-F5344CB8AC3E}">
+        <p14:creationId xmlns:p14="http://schemas.microsoft.com/office/powerpoint/2010/main" val="1596432399"/>
       </p:ext>
     </p:extLst>
   </p:cSld>
@@ -4437,16 +4549,6 @@
           <a:p>
             <a:pPr lvl="0"/>
             <a:r>
-              <a:rPr lang="en-US" altLang="zh-TW" sz="3200" b="1" dirty="0" err="1">
-                <a:solidFill>
-                  <a:schemeClr val="accent2">
-                    <a:lumMod val="75000"/>
-                  </a:schemeClr>
-                </a:solidFill>
-              </a:rPr>
-              <a:t>Keypoint</a:t>
-            </a:r>
-            <a:r>
               <a:rPr lang="zh-TW" altLang="en-US" sz="3200" b="1" dirty="0">
                 <a:solidFill>
                   <a:schemeClr val="accent2">
@@ -4454,38 +4556,15 @@
                   </a:schemeClr>
                 </a:solidFill>
               </a:rPr>
-              <a:t> </a:t>
+              <a:t>關鍵點標註軟體</a:t>
             </a:r>
-            <a:r>
-              <a:rPr lang="en-US" altLang="zh-TW" sz="3200" b="1" dirty="0">
-                <a:solidFill>
-                  <a:schemeClr val="accent2">
-                    <a:lumMod val="75000"/>
-                  </a:schemeClr>
-                </a:solidFill>
-              </a:rPr>
-              <a:t>Annotation</a:t>
-            </a:r>
-            <a:r>
-              <a:rPr lang="zh-TW" altLang="en-US" sz="3200" b="1" dirty="0">
-                <a:solidFill>
-                  <a:schemeClr val="accent2">
-                    <a:lumMod val="75000"/>
-                  </a:schemeClr>
-                </a:solidFill>
-              </a:rPr>
-              <a:t> </a:t>
-            </a:r>
-            <a:r>
-              <a:rPr lang="en-US" altLang="zh-TW" sz="3200" b="1" dirty="0">
-                <a:solidFill>
-                  <a:schemeClr val="accent2">
-                    <a:lumMod val="75000"/>
-                  </a:schemeClr>
-                </a:solidFill>
-              </a:rPr>
-              <a:t>Tool</a:t>
-            </a:r>
+            <a:endParaRPr lang="en-US" altLang="zh-TW" sz="3200" b="1" dirty="0">
+              <a:solidFill>
+                <a:schemeClr val="accent2">
+                  <a:lumMod val="75000"/>
+                </a:schemeClr>
+              </a:solidFill>
+            </a:endParaRPr>
           </a:p>
           <a:p>
             <a:pPr lvl="0"/>
@@ -4498,12 +4577,12 @@
           <a:p>
             <a:pPr lvl="0"/>
             <a:r>
-              <a:rPr lang="en-US" altLang="zh-TW" sz="2400" b="1" dirty="0">
+              <a:rPr lang="zh-TW" altLang="en-US" sz="2400" b="1" dirty="0">
                 <a:solidFill>
                   <a:srgbClr val="29ADC4"/>
                 </a:solidFill>
               </a:rPr>
-              <a:t>User Guide</a:t>
+              <a:t>使用指南</a:t>
             </a:r>
             <a:endParaRPr lang="zh-TW" altLang="en-US" sz="2400" b="1" i="0" u="none" strike="noStrike" cap="none" dirty="0">
               <a:solidFill>
@@ -4529,7 +4608,7 @@
 </p:sld>
 </file>
 
-<file path=ppt/slides/slide2.xml><?xml version="1.0" encoding="utf-8"?>
+<file path=ppt/slides/slide10.xml><?xml version="1.0" encoding="utf-8"?>
 <p:sld xmlns:a="http://schemas.openxmlformats.org/drawingml/2006/main" xmlns:r="http://schemas.openxmlformats.org/officeDocument/2006/relationships" xmlns:p="http://schemas.openxmlformats.org/presentationml/2006/main">
   <p:cSld>
     <p:spTree>
@@ -4630,13 +4709,769 @@
           <a:lstStyle/>
           <a:p>
             <a:r>
+              <a:rPr lang="zh-TW" altLang="en-US" sz="2800" b="1" dirty="0">
+                <a:latin typeface="Calibri" panose="020F0502020204030204" pitchFamily="34" charset="0"/>
+                <a:ea typeface="Chiron Sans HK Pro Medium" panose="020B0600000000000000" pitchFamily="34" charset="-120"/>
+                <a:cs typeface="Calibri" panose="020F0502020204030204" pitchFamily="34" charset="0"/>
+                <a:sym typeface="Arial"/>
+              </a:rPr>
+              <a:t>新增功能 </a:t>
+            </a:r>
+            <a:r>
               <a:rPr lang="en-US" altLang="zh-TW" sz="2800" b="1" dirty="0">
                 <a:latin typeface="Calibri" panose="020F0502020204030204" pitchFamily="34" charset="0"/>
                 <a:ea typeface="Chiron Sans HK Pro Medium" panose="020B0600000000000000" pitchFamily="34" charset="-120"/>
                 <a:cs typeface="Calibri" panose="020F0502020204030204" pitchFamily="34" charset="0"/>
                 <a:sym typeface="Arial"/>
               </a:rPr>
-              <a:t>Overview</a:t>
+              <a:t>– </a:t>
+            </a:r>
+            <a:r>
+              <a:rPr lang="zh-TW" altLang="en-US" sz="2800" b="1" dirty="0">
+                <a:latin typeface="Calibri" panose="020F0502020204030204" pitchFamily="34" charset="0"/>
+                <a:ea typeface="Chiron Sans HK Pro Medium" panose="020B0600000000000000" pitchFamily="34" charset="-120"/>
+                <a:cs typeface="Calibri" panose="020F0502020204030204" pitchFamily="34" charset="0"/>
+                <a:sym typeface="Arial"/>
+              </a:rPr>
+              <a:t>放大與縮小</a:t>
+            </a:r>
+            <a:br>
+              <a:rPr lang="en-US" altLang="zh-TW" sz="2800" b="1" dirty="0">
+                <a:latin typeface="Chiron Sans HK Pro Medium" panose="020B0600000000000000" pitchFamily="34" charset="-120"/>
+                <a:ea typeface="Chiron Sans HK Pro Medium" panose="020B0600000000000000" pitchFamily="34" charset="-120"/>
+                <a:sym typeface="Arial"/>
+              </a:rPr>
+            </a:br>
+            <a:endParaRPr sz="2800" b="1" dirty="0">
+              <a:latin typeface="Chiron Sans HK Pro Medium" panose="020B0600000000000000" pitchFamily="34" charset="-120"/>
+              <a:ea typeface="Chiron Sans HK Pro Medium" panose="020B0600000000000000" pitchFamily="34" charset="-120"/>
+              <a:sym typeface="Arial"/>
+            </a:endParaRPr>
+          </a:p>
+        </p:txBody>
+      </p:sp>
+      <p:sp>
+        <p:nvSpPr>
+          <p:cNvPr id="671" name="Google Shape;671;p18"/>
+          <p:cNvSpPr txBox="1">
+            <a:spLocks noGrp="1"/>
+          </p:cNvSpPr>
+          <p:nvPr>
+            <p:ph type="sldNum" idx="12"/>
+          </p:nvPr>
+        </p:nvSpPr>
+        <p:spPr>
+          <a:xfrm>
+            <a:off x="8649025" y="4636750"/>
+            <a:ext cx="456900" cy="468600"/>
+          </a:xfrm>
+          <a:prstGeom prst="rect">
+            <a:avLst/>
+          </a:prstGeom>
+        </p:spPr>
+        <p:txBody>
+          <a:bodyPr spcFirstLastPara="1" wrap="square" lIns="0" tIns="0" rIns="0" bIns="0" anchor="b" anchorCtr="0">
+            <a:noAutofit/>
+          </a:bodyPr>
+          <a:lstStyle/>
+          <a:p>
+            <a:pPr marL="0" lvl="0" indent="0" algn="r" rtl="0">
+              <a:spcBef>
+                <a:spcPts val="0"/>
+              </a:spcBef>
+              <a:spcAft>
+                <a:spcPts val="0"/>
+              </a:spcAft>
+              <a:buNone/>
+            </a:pPr>
+            <a:fld id="{00000000-1234-1234-1234-123412341234}" type="slidenum">
+              <a:rPr lang="en-US" altLang="zh-TW" b="1" dirty="0">
+                <a:latin typeface="+mj-ea"/>
+                <a:ea typeface="+mj-ea"/>
+              </a:rPr>
+              <a:t>10</a:t>
+            </a:fld>
+            <a:endParaRPr b="1" dirty="0">
+              <a:latin typeface="+mj-ea"/>
+              <a:ea typeface="+mj-ea"/>
+            </a:endParaRPr>
+          </a:p>
+        </p:txBody>
+      </p:sp>
+      <p:sp>
+        <p:nvSpPr>
+          <p:cNvPr id="12" name="Google Shape;112;p17">
+            <a:extLst>
+              <a:ext uri="{FF2B5EF4-FFF2-40B4-BE49-F238E27FC236}">
+                <a16:creationId xmlns:a16="http://schemas.microsoft.com/office/drawing/2014/main" id="{82F30078-3C89-4938-BB13-C9ABACFDB53C}"/>
+              </a:ext>
+            </a:extLst>
+          </p:cNvPr>
+          <p:cNvSpPr/>
+          <p:nvPr/>
+        </p:nvSpPr>
+        <p:spPr>
+          <a:xfrm>
+            <a:off x="559600" y="4183786"/>
+            <a:ext cx="7529825" cy="1200329"/>
+          </a:xfrm>
+          <a:prstGeom prst="rect">
+            <a:avLst/>
+          </a:prstGeom>
+          <a:noFill/>
+          <a:ln>
+            <a:noFill/>
+          </a:ln>
+        </p:spPr>
+        <p:txBody>
+          <a:bodyPr spcFirstLastPara="1" wrap="square" lIns="91425" tIns="45700" rIns="91425" bIns="45700" anchor="t" anchorCtr="0">
+            <a:noAutofit/>
+          </a:bodyPr>
+          <a:lstStyle/>
+          <a:p>
+            <a:pPr lvl="0" algn="just"/>
+            <a:r>
+              <a:rPr lang="zh-TW" altLang="en-US" sz="2000" dirty="0">
+                <a:solidFill>
+                  <a:schemeClr val="dk1"/>
+                </a:solidFill>
+                <a:latin typeface="Calibri"/>
+                <a:ea typeface="Calibri"/>
+                <a:cs typeface="Calibri"/>
+                <a:sym typeface="Calibri"/>
+              </a:rPr>
+              <a:t>標註與展示的視窗，如果使用</a:t>
+            </a:r>
+            <a:r>
+              <a:rPr lang="zh-TW" altLang="en-US" sz="2000" b="1" dirty="0">
+                <a:solidFill>
+                  <a:schemeClr val="dk1"/>
+                </a:solidFill>
+                <a:latin typeface="Calibri"/>
+                <a:ea typeface="Calibri"/>
+                <a:cs typeface="Calibri"/>
+                <a:sym typeface="Calibri"/>
+              </a:rPr>
+              <a:t>滑鼠滾輪</a:t>
+            </a:r>
+            <a:r>
+              <a:rPr lang="zh-TW" altLang="en-US" sz="2000" dirty="0">
+                <a:solidFill>
+                  <a:schemeClr val="dk1"/>
+                </a:solidFill>
+                <a:latin typeface="Calibri"/>
+                <a:ea typeface="Calibri"/>
+                <a:cs typeface="Calibri"/>
+                <a:sym typeface="Calibri"/>
+              </a:rPr>
+              <a:t>，可以隨意</a:t>
+            </a:r>
+            <a:r>
+              <a:rPr lang="zh-TW" altLang="en-US" sz="2000" b="1" dirty="0">
+                <a:solidFill>
+                  <a:schemeClr val="dk1"/>
+                </a:solidFill>
+                <a:latin typeface="Calibri"/>
+                <a:ea typeface="Calibri"/>
+                <a:cs typeface="Calibri"/>
+                <a:sym typeface="Calibri"/>
+              </a:rPr>
+              <a:t>放大與縮小</a:t>
+            </a:r>
+            <a:r>
+              <a:rPr lang="zh-TW" altLang="en-US" sz="2000" dirty="0">
+                <a:solidFill>
+                  <a:schemeClr val="dk1"/>
+                </a:solidFill>
+                <a:latin typeface="Calibri"/>
+                <a:ea typeface="Calibri"/>
+                <a:cs typeface="Calibri"/>
+                <a:sym typeface="Calibri"/>
+              </a:rPr>
+              <a:t>。</a:t>
+            </a:r>
+            <a:endParaRPr sz="1200" dirty="0"/>
+          </a:p>
+        </p:txBody>
+      </p:sp>
+      <p:pic>
+        <p:nvPicPr>
+          <p:cNvPr id="3" name="圖片 2">
+            <a:extLst>
+              <a:ext uri="{FF2B5EF4-FFF2-40B4-BE49-F238E27FC236}">
+                <a16:creationId xmlns:a16="http://schemas.microsoft.com/office/drawing/2014/main" id="{170BD5F9-26FD-4D27-B58E-AD05E31C5EF2}"/>
+              </a:ext>
+            </a:extLst>
+          </p:cNvPr>
+          <p:cNvPicPr>
+            <a:picLocks noChangeAspect="1"/>
+          </p:cNvPicPr>
+          <p:nvPr/>
+        </p:nvPicPr>
+        <p:blipFill>
+          <a:blip r:embed="rId3"/>
+          <a:stretch>
+            <a:fillRect/>
+          </a:stretch>
+        </p:blipFill>
+        <p:spPr>
+          <a:xfrm>
+            <a:off x="1390649" y="1652102"/>
+            <a:ext cx="2244725" cy="2063831"/>
+          </a:xfrm>
+          <a:prstGeom prst="rect">
+            <a:avLst/>
+          </a:prstGeom>
+        </p:spPr>
+      </p:pic>
+      <p:pic>
+        <p:nvPicPr>
+          <p:cNvPr id="5" name="圖片 4">
+            <a:extLst>
+              <a:ext uri="{FF2B5EF4-FFF2-40B4-BE49-F238E27FC236}">
+                <a16:creationId xmlns:a16="http://schemas.microsoft.com/office/drawing/2014/main" id="{B093F7A5-EE94-4437-9802-EEE3E8256998}"/>
+              </a:ext>
+            </a:extLst>
+          </p:cNvPr>
+          <p:cNvPicPr>
+            <a:picLocks noChangeAspect="1"/>
+          </p:cNvPicPr>
+          <p:nvPr/>
+        </p:nvPicPr>
+        <p:blipFill rotWithShape="1">
+          <a:blip r:embed="rId4"/>
+          <a:srcRect b="3992"/>
+          <a:stretch/>
+        </p:blipFill>
+        <p:spPr>
+          <a:xfrm>
+            <a:off x="4438650" y="1255854"/>
+            <a:ext cx="4284674" cy="2854832"/>
+          </a:xfrm>
+          <a:prstGeom prst="rect">
+            <a:avLst/>
+          </a:prstGeom>
+        </p:spPr>
+      </p:pic>
+      <p:sp>
+        <p:nvSpPr>
+          <p:cNvPr id="11" name="Google Shape;670;p18">
+            <a:extLst>
+              <a:ext uri="{FF2B5EF4-FFF2-40B4-BE49-F238E27FC236}">
+                <a16:creationId xmlns:a16="http://schemas.microsoft.com/office/drawing/2014/main" id="{D12366FD-E699-4F27-8D74-30C1EFCB3ABC}"/>
+              </a:ext>
+            </a:extLst>
+          </p:cNvPr>
+          <p:cNvSpPr txBox="1">
+            <a:spLocks/>
+          </p:cNvSpPr>
+          <p:nvPr/>
+        </p:nvSpPr>
+        <p:spPr>
+          <a:xfrm>
+            <a:off x="457199" y="823813"/>
+            <a:ext cx="2838640" cy="217588"/>
+          </a:xfrm>
+          <a:prstGeom prst="rect">
+            <a:avLst/>
+          </a:prstGeom>
+          <a:noFill/>
+          <a:ln>
+            <a:noFill/>
+          </a:ln>
+        </p:spPr>
+        <p:txBody>
+          <a:bodyPr spcFirstLastPara="1" wrap="square" lIns="0" tIns="0" rIns="0" bIns="0" anchor="t" anchorCtr="0">
+            <a:noAutofit/>
+          </a:bodyPr>
+          <a:lstStyle>
+            <a:defPPr marR="0" lvl="0" algn="l" rtl="0">
+              <a:lnSpc>
+                <a:spcPct val="100000"/>
+              </a:lnSpc>
+              <a:spcBef>
+                <a:spcPts val="0"/>
+              </a:spcBef>
+              <a:spcAft>
+                <a:spcPts val="0"/>
+              </a:spcAft>
+            </a:defPPr>
+            <a:lvl1pPr marR="0" lvl="0" algn="l" rtl="0">
+              <a:lnSpc>
+                <a:spcPct val="80000"/>
+              </a:lnSpc>
+              <a:spcBef>
+                <a:spcPts val="0"/>
+              </a:spcBef>
+              <a:spcAft>
+                <a:spcPts val="0"/>
+              </a:spcAft>
+              <a:buClr>
+                <a:schemeClr val="accent2"/>
+              </a:buClr>
+              <a:buSzPts val="4200"/>
+              <a:buFont typeface="Microsoft JhengHei"/>
+              <a:buNone/>
+              <a:defRPr sz="4200" b="0" i="0" u="none" strike="noStrike" cap="none">
+                <a:solidFill>
+                  <a:schemeClr val="accent2"/>
+                </a:solidFill>
+                <a:latin typeface="Microsoft JhengHei"/>
+                <a:ea typeface="Microsoft JhengHei"/>
+                <a:cs typeface="Microsoft JhengHei"/>
+                <a:sym typeface="Microsoft JhengHei"/>
+              </a:defRPr>
+            </a:lvl1pPr>
+            <a:lvl2pPr marR="0" lvl="1" algn="l" rtl="0">
+              <a:lnSpc>
+                <a:spcPct val="80000"/>
+              </a:lnSpc>
+              <a:spcBef>
+                <a:spcPts val="0"/>
+              </a:spcBef>
+              <a:spcAft>
+                <a:spcPts val="0"/>
+              </a:spcAft>
+              <a:buClr>
+                <a:schemeClr val="accent2"/>
+              </a:buClr>
+              <a:buSzPts val="4200"/>
+              <a:buFont typeface="Microsoft JhengHei"/>
+              <a:buNone/>
+              <a:defRPr sz="4200" b="0" i="0" u="none" strike="noStrike" cap="none">
+                <a:solidFill>
+                  <a:schemeClr val="accent2"/>
+                </a:solidFill>
+                <a:latin typeface="Microsoft JhengHei"/>
+                <a:ea typeface="Microsoft JhengHei"/>
+                <a:cs typeface="Microsoft JhengHei"/>
+                <a:sym typeface="Microsoft JhengHei"/>
+              </a:defRPr>
+            </a:lvl2pPr>
+            <a:lvl3pPr marR="0" lvl="2" algn="l" rtl="0">
+              <a:lnSpc>
+                <a:spcPct val="80000"/>
+              </a:lnSpc>
+              <a:spcBef>
+                <a:spcPts val="0"/>
+              </a:spcBef>
+              <a:spcAft>
+                <a:spcPts val="0"/>
+              </a:spcAft>
+              <a:buClr>
+                <a:schemeClr val="accent2"/>
+              </a:buClr>
+              <a:buSzPts val="4200"/>
+              <a:buFont typeface="Microsoft JhengHei"/>
+              <a:buNone/>
+              <a:defRPr sz="4200" b="0" i="0" u="none" strike="noStrike" cap="none">
+                <a:solidFill>
+                  <a:schemeClr val="accent2"/>
+                </a:solidFill>
+                <a:latin typeface="Microsoft JhengHei"/>
+                <a:ea typeface="Microsoft JhengHei"/>
+                <a:cs typeface="Microsoft JhengHei"/>
+                <a:sym typeface="Microsoft JhengHei"/>
+              </a:defRPr>
+            </a:lvl3pPr>
+            <a:lvl4pPr marR="0" lvl="3" algn="l" rtl="0">
+              <a:lnSpc>
+                <a:spcPct val="80000"/>
+              </a:lnSpc>
+              <a:spcBef>
+                <a:spcPts val="0"/>
+              </a:spcBef>
+              <a:spcAft>
+                <a:spcPts val="0"/>
+              </a:spcAft>
+              <a:buClr>
+                <a:schemeClr val="accent2"/>
+              </a:buClr>
+              <a:buSzPts val="4200"/>
+              <a:buFont typeface="Microsoft JhengHei"/>
+              <a:buNone/>
+              <a:defRPr sz="4200" b="0" i="0" u="none" strike="noStrike" cap="none">
+                <a:solidFill>
+                  <a:schemeClr val="accent2"/>
+                </a:solidFill>
+                <a:latin typeface="Microsoft JhengHei"/>
+                <a:ea typeface="Microsoft JhengHei"/>
+                <a:cs typeface="Microsoft JhengHei"/>
+                <a:sym typeface="Microsoft JhengHei"/>
+              </a:defRPr>
+            </a:lvl4pPr>
+            <a:lvl5pPr marR="0" lvl="4" algn="l" rtl="0">
+              <a:lnSpc>
+                <a:spcPct val="80000"/>
+              </a:lnSpc>
+              <a:spcBef>
+                <a:spcPts val="0"/>
+              </a:spcBef>
+              <a:spcAft>
+                <a:spcPts val="0"/>
+              </a:spcAft>
+              <a:buClr>
+                <a:schemeClr val="accent2"/>
+              </a:buClr>
+              <a:buSzPts val="4200"/>
+              <a:buFont typeface="Microsoft JhengHei"/>
+              <a:buNone/>
+              <a:defRPr sz="4200" b="0" i="0" u="none" strike="noStrike" cap="none">
+                <a:solidFill>
+                  <a:schemeClr val="accent2"/>
+                </a:solidFill>
+                <a:latin typeface="Microsoft JhengHei"/>
+                <a:ea typeface="Microsoft JhengHei"/>
+                <a:cs typeface="Microsoft JhengHei"/>
+                <a:sym typeface="Microsoft JhengHei"/>
+              </a:defRPr>
+            </a:lvl5pPr>
+            <a:lvl6pPr marR="0" lvl="5" algn="l" rtl="0">
+              <a:lnSpc>
+                <a:spcPct val="80000"/>
+              </a:lnSpc>
+              <a:spcBef>
+                <a:spcPts val="0"/>
+              </a:spcBef>
+              <a:spcAft>
+                <a:spcPts val="0"/>
+              </a:spcAft>
+              <a:buClr>
+                <a:schemeClr val="accent2"/>
+              </a:buClr>
+              <a:buSzPts val="4200"/>
+              <a:buFont typeface="Microsoft JhengHei"/>
+              <a:buNone/>
+              <a:defRPr sz="4200" b="0" i="0" u="none" strike="noStrike" cap="none">
+                <a:solidFill>
+                  <a:schemeClr val="accent2"/>
+                </a:solidFill>
+                <a:latin typeface="Microsoft JhengHei"/>
+                <a:ea typeface="Microsoft JhengHei"/>
+                <a:cs typeface="Microsoft JhengHei"/>
+                <a:sym typeface="Microsoft JhengHei"/>
+              </a:defRPr>
+            </a:lvl6pPr>
+            <a:lvl7pPr marR="0" lvl="6" algn="l" rtl="0">
+              <a:lnSpc>
+                <a:spcPct val="80000"/>
+              </a:lnSpc>
+              <a:spcBef>
+                <a:spcPts val="0"/>
+              </a:spcBef>
+              <a:spcAft>
+                <a:spcPts val="0"/>
+              </a:spcAft>
+              <a:buClr>
+                <a:schemeClr val="accent2"/>
+              </a:buClr>
+              <a:buSzPts val="4200"/>
+              <a:buFont typeface="Microsoft JhengHei"/>
+              <a:buNone/>
+              <a:defRPr sz="4200" b="0" i="0" u="none" strike="noStrike" cap="none">
+                <a:solidFill>
+                  <a:schemeClr val="accent2"/>
+                </a:solidFill>
+                <a:latin typeface="Microsoft JhengHei"/>
+                <a:ea typeface="Microsoft JhengHei"/>
+                <a:cs typeface="Microsoft JhengHei"/>
+                <a:sym typeface="Microsoft JhengHei"/>
+              </a:defRPr>
+            </a:lvl7pPr>
+            <a:lvl8pPr marR="0" lvl="7" algn="l" rtl="0">
+              <a:lnSpc>
+                <a:spcPct val="80000"/>
+              </a:lnSpc>
+              <a:spcBef>
+                <a:spcPts val="0"/>
+              </a:spcBef>
+              <a:spcAft>
+                <a:spcPts val="0"/>
+              </a:spcAft>
+              <a:buClr>
+                <a:schemeClr val="accent2"/>
+              </a:buClr>
+              <a:buSzPts val="4200"/>
+              <a:buFont typeface="Microsoft JhengHei"/>
+              <a:buNone/>
+              <a:defRPr sz="4200" b="0" i="0" u="none" strike="noStrike" cap="none">
+                <a:solidFill>
+                  <a:schemeClr val="accent2"/>
+                </a:solidFill>
+                <a:latin typeface="Microsoft JhengHei"/>
+                <a:ea typeface="Microsoft JhengHei"/>
+                <a:cs typeface="Microsoft JhengHei"/>
+                <a:sym typeface="Microsoft JhengHei"/>
+              </a:defRPr>
+            </a:lvl8pPr>
+            <a:lvl9pPr marR="0" lvl="8" algn="l" rtl="0">
+              <a:lnSpc>
+                <a:spcPct val="80000"/>
+              </a:lnSpc>
+              <a:spcBef>
+                <a:spcPts val="0"/>
+              </a:spcBef>
+              <a:spcAft>
+                <a:spcPts val="0"/>
+              </a:spcAft>
+              <a:buClr>
+                <a:schemeClr val="accent2"/>
+              </a:buClr>
+              <a:buSzPts val="4200"/>
+              <a:buFont typeface="Microsoft JhengHei"/>
+              <a:buNone/>
+              <a:defRPr sz="4200" b="0" i="0" u="none" strike="noStrike" cap="none">
+                <a:solidFill>
+                  <a:schemeClr val="accent2"/>
+                </a:solidFill>
+                <a:latin typeface="Microsoft JhengHei"/>
+                <a:ea typeface="Microsoft JhengHei"/>
+                <a:cs typeface="Microsoft JhengHei"/>
+                <a:sym typeface="Microsoft JhengHei"/>
+              </a:defRPr>
+            </a:lvl9pPr>
+          </a:lstStyle>
+          <a:p>
+            <a:r>
+              <a:rPr lang="en-US" altLang="zh-TW" sz="2000" b="1" dirty="0">
+                <a:solidFill>
+                  <a:srgbClr val="E95689"/>
+                </a:solidFill>
+                <a:latin typeface="Calibri" panose="020F0502020204030204" pitchFamily="34" charset="0"/>
+                <a:ea typeface="Chiron Sans HK Pro Medium" panose="020B0600000000000000" pitchFamily="34" charset="-120"/>
+                <a:cs typeface="Calibri" panose="020F0502020204030204" pitchFamily="34" charset="0"/>
+                <a:sym typeface="Arial"/>
+              </a:rPr>
+              <a:t>2025/12/19</a:t>
+            </a:r>
+          </a:p>
+        </p:txBody>
+      </p:sp>
+    </p:spTree>
+    <p:extLst>
+      <p:ext uri="{BB962C8B-B14F-4D97-AF65-F5344CB8AC3E}">
+        <p14:creationId xmlns:p14="http://schemas.microsoft.com/office/powerpoint/2010/main" val="1616525644"/>
+      </p:ext>
+    </p:extLst>
+  </p:cSld>
+  <p:clrMapOvr>
+    <a:masterClrMapping/>
+  </p:clrMapOvr>
+</p:sld>
+</file>
+
+<file path=ppt/slides/slide2.xml><?xml version="1.0" encoding="utf-8"?>
+<p:sld xmlns:a="http://schemas.openxmlformats.org/drawingml/2006/main" xmlns:r="http://schemas.openxmlformats.org/officeDocument/2006/relationships" xmlns:p="http://schemas.openxmlformats.org/presentationml/2006/main">
+  <p:cSld>
+    <p:spTree>
+      <p:nvGrpSpPr>
+        <p:cNvPr id="1" name="Shape 669"/>
+        <p:cNvGrpSpPr/>
+        <p:nvPr/>
+      </p:nvGrpSpPr>
+      <p:grpSpPr>
+        <a:xfrm>
+          <a:off x="0" y="0"/>
+          <a:ext cx="0" cy="0"/>
+          <a:chOff x="0" y="0"/>
+          <a:chExt cx="0" cy="0"/>
+        </a:xfrm>
+      </p:grpSpPr>
+      <p:sp>
+        <p:nvSpPr>
+          <p:cNvPr id="21" name="矩形 20">
+            <a:extLst>
+              <a:ext uri="{FF2B5EF4-FFF2-40B4-BE49-F238E27FC236}">
+                <a16:creationId xmlns:a16="http://schemas.microsoft.com/office/drawing/2014/main" id="{F0DCB05E-4A02-4B12-9417-F4875EA08B43}"/>
+              </a:ext>
+            </a:extLst>
+          </p:cNvPr>
+          <p:cNvSpPr/>
+          <p:nvPr/>
+        </p:nvSpPr>
+        <p:spPr>
+          <a:xfrm>
+            <a:off x="0" y="1184248"/>
+            <a:ext cx="9144000" cy="3452502"/>
+          </a:xfrm>
+          <a:prstGeom prst="rect">
+            <a:avLst/>
+          </a:prstGeom>
+          <a:solidFill>
+            <a:schemeClr val="bg1">
+              <a:lumMod val="95000"/>
+            </a:schemeClr>
+          </a:solidFill>
+          <a:ln>
+            <a:noFill/>
+          </a:ln>
+        </p:spPr>
+        <p:style>
+          <a:lnRef idx="2">
+            <a:schemeClr val="accent1">
+              <a:shade val="50000"/>
+            </a:schemeClr>
+          </a:lnRef>
+          <a:fillRef idx="1">
+            <a:schemeClr val="accent1"/>
+          </a:fillRef>
+          <a:effectRef idx="0">
+            <a:schemeClr val="accent1"/>
+          </a:effectRef>
+          <a:fontRef idx="minor">
+            <a:schemeClr val="lt1"/>
+          </a:fontRef>
+        </p:style>
+        <p:txBody>
+          <a:bodyPr rtlCol="0" anchor="ctr"/>
+          <a:lstStyle/>
+          <a:p>
+            <a:pPr algn="ctr"/>
+            <a:endParaRPr lang="zh-TW" altLang="en-US" dirty="0"/>
+          </a:p>
+        </p:txBody>
+      </p:sp>
+      <p:pic>
+        <p:nvPicPr>
+          <p:cNvPr id="5" name="圖片 4">
+            <a:extLst>
+              <a:ext uri="{FF2B5EF4-FFF2-40B4-BE49-F238E27FC236}">
+                <a16:creationId xmlns:a16="http://schemas.microsoft.com/office/drawing/2014/main" id="{6DB98197-C177-4C4A-A3EA-58E9FCF39AE3}"/>
+              </a:ext>
+            </a:extLst>
+          </p:cNvPr>
+          <p:cNvPicPr>
+            <a:picLocks noChangeAspect="1"/>
+          </p:cNvPicPr>
+          <p:nvPr/>
+        </p:nvPicPr>
+        <p:blipFill>
+          <a:blip r:embed="rId3"/>
+          <a:stretch>
+            <a:fillRect/>
+          </a:stretch>
+        </p:blipFill>
+        <p:spPr>
+          <a:xfrm>
+            <a:off x="3354156" y="1213231"/>
+            <a:ext cx="2046788" cy="3394536"/>
+          </a:xfrm>
+          <a:prstGeom prst="rect">
+            <a:avLst/>
+          </a:prstGeom>
+        </p:spPr>
+      </p:pic>
+      <p:cxnSp>
+        <p:nvCxnSpPr>
+          <p:cNvPr id="84" name="Google Shape;771;p21">
+            <a:extLst>
+              <a:ext uri="{FF2B5EF4-FFF2-40B4-BE49-F238E27FC236}">
+                <a16:creationId xmlns:a16="http://schemas.microsoft.com/office/drawing/2014/main" id="{583A8B18-3E02-4BA2-B9C2-5BCCBA9193BF}"/>
+              </a:ext>
+            </a:extLst>
+          </p:cNvPr>
+          <p:cNvCxnSpPr>
+            <a:cxnSpLocks/>
+            <a:stCxn id="82" idx="1"/>
+          </p:cNvCxnSpPr>
+          <p:nvPr/>
+        </p:nvCxnSpPr>
+        <p:spPr>
+          <a:xfrm rot="10800000">
+            <a:off x="4880765" y="4473913"/>
+            <a:ext cx="917813" cy="397262"/>
+          </a:xfrm>
+          <a:prstGeom prst="bentConnector3">
+            <a:avLst>
+              <a:gd name="adj1" fmla="val 50000"/>
+            </a:avLst>
+          </a:prstGeom>
+          <a:noFill/>
+          <a:ln w="19050" cap="flat" cmpd="sng">
+            <a:solidFill>
+              <a:srgbClr val="2683C6"/>
+            </a:solidFill>
+            <a:prstDash val="solid"/>
+            <a:round/>
+            <a:headEnd type="none" w="med" len="med"/>
+            <a:tailEnd type="oval" w="med" len="med"/>
+          </a:ln>
+        </p:spPr>
+      </p:cxnSp>
+      <p:cxnSp>
+        <p:nvCxnSpPr>
+          <p:cNvPr id="79" name="Google Shape;771;p21">
+            <a:extLst>
+              <a:ext uri="{FF2B5EF4-FFF2-40B4-BE49-F238E27FC236}">
+                <a16:creationId xmlns:a16="http://schemas.microsoft.com/office/drawing/2014/main" id="{B420DCB4-18DA-4207-84F1-3FF1A7D5E8FA}"/>
+              </a:ext>
+            </a:extLst>
+          </p:cNvPr>
+          <p:cNvCxnSpPr>
+            <a:cxnSpLocks/>
+            <a:stCxn id="77" idx="1"/>
+          </p:cNvCxnSpPr>
+          <p:nvPr/>
+        </p:nvCxnSpPr>
+        <p:spPr>
+          <a:xfrm rot="10800000">
+            <a:off x="5171673" y="2149833"/>
+            <a:ext cx="1083281" cy="358675"/>
+          </a:xfrm>
+          <a:prstGeom prst="bentConnector3">
+            <a:avLst>
+              <a:gd name="adj1" fmla="val 50000"/>
+            </a:avLst>
+          </a:prstGeom>
+          <a:noFill/>
+          <a:ln w="19050" cap="flat" cmpd="sng">
+            <a:solidFill>
+              <a:srgbClr val="2683C6"/>
+            </a:solidFill>
+            <a:prstDash val="solid"/>
+            <a:round/>
+            <a:headEnd type="none" w="med" len="med"/>
+            <a:tailEnd type="oval" w="med" len="med"/>
+          </a:ln>
+        </p:spPr>
+      </p:cxnSp>
+      <p:sp>
+        <p:nvSpPr>
+          <p:cNvPr id="670" name="Google Shape;670;p18"/>
+          <p:cNvSpPr txBox="1">
+            <a:spLocks noGrp="1"/>
+          </p:cNvSpPr>
+          <p:nvPr>
+            <p:ph type="title"/>
+          </p:nvPr>
+        </p:nvSpPr>
+        <p:spPr>
+          <a:xfrm>
+            <a:off x="457200" y="457322"/>
+            <a:ext cx="7840700" cy="468600"/>
+          </a:xfrm>
+          <a:prstGeom prst="rect">
+            <a:avLst/>
+          </a:prstGeom>
+          <a:noFill/>
+          <a:ln>
+            <a:noFill/>
+          </a:ln>
+        </p:spPr>
+        <p:txBody>
+          <a:bodyPr spcFirstLastPara="1" wrap="square" lIns="0" tIns="0" rIns="0" bIns="0" anchor="t" anchorCtr="0">
+            <a:noAutofit/>
+          </a:bodyPr>
+          <a:lstStyle/>
+          <a:p>
+            <a:r>
+              <a:rPr lang="zh-TW" altLang="en-US" sz="2800" b="1" dirty="0">
+                <a:latin typeface="Calibri" panose="020F0502020204030204" pitchFamily="34" charset="0"/>
+                <a:ea typeface="Chiron Sans HK Pro Medium" panose="020B0600000000000000" pitchFamily="34" charset="-120"/>
+                <a:cs typeface="Calibri" panose="020F0502020204030204" pitchFamily="34" charset="0"/>
+                <a:sym typeface="Arial"/>
+              </a:rPr>
+              <a:t>概要</a:t>
             </a:r>
             <a:br>
               <a:rPr lang="en-US" altLang="zh-TW" sz="2800" b="1" dirty="0">
@@ -4703,36 +5538,6 @@
           </a:p>
         </p:txBody>
       </p:sp>
-      <p:pic>
-        <p:nvPicPr>
-          <p:cNvPr id="28" name="圖片 27">
-            <a:extLst>
-              <a:ext uri="{FF2B5EF4-FFF2-40B4-BE49-F238E27FC236}">
-                <a16:creationId xmlns:a16="http://schemas.microsoft.com/office/drawing/2014/main" id="{EB1C6F19-ADAD-44C7-A8DE-2D1085403729}"/>
-              </a:ext>
-            </a:extLst>
-          </p:cNvPr>
-          <p:cNvPicPr>
-            <a:picLocks noChangeAspect="1"/>
-          </p:cNvPicPr>
-          <p:nvPr/>
-        </p:nvPicPr>
-        <p:blipFill>
-          <a:blip r:embed="rId3"/>
-          <a:stretch>
-            <a:fillRect/>
-          </a:stretch>
-        </p:blipFill>
-        <p:spPr>
-          <a:xfrm>
-            <a:off x="3478594" y="1447954"/>
-            <a:ext cx="1473919" cy="3030983"/>
-          </a:xfrm>
-          <a:prstGeom prst="rect">
-            <a:avLst/>
-          </a:prstGeom>
-        </p:spPr>
-      </p:pic>
       <p:cxnSp>
         <p:nvCxnSpPr>
           <p:cNvPr id="14" name="Google Shape;771;p21">
@@ -4749,9 +5554,9 @@
           <p:nvPr/>
         </p:nvCxnSpPr>
         <p:spPr>
-          <a:xfrm rot="10800000">
-            <a:off x="4802193" y="2262094"/>
-            <a:ext cx="1170046" cy="106353"/>
+          <a:xfrm rot="10800000" flipV="1">
+            <a:off x="5171672" y="1991935"/>
+            <a:ext cx="1083589" cy="1"/>
           </a:xfrm>
           <a:prstGeom prst="bentConnector3">
             <a:avLst>
@@ -4786,7 +5591,7 @@
         </p:nvCxnSpPr>
         <p:spPr>
           <a:xfrm flipH="1">
-            <a:off x="4850077" y="1866196"/>
+            <a:off x="5113117" y="1500810"/>
             <a:ext cx="1141836" cy="0"/>
           </a:xfrm>
           <a:prstGeom prst="line">
@@ -4826,7 +5631,7 @@
         </p:nvGrpSpPr>
         <p:grpSpPr>
           <a:xfrm>
-            <a:off x="5906649" y="1598461"/>
+            <a:off x="6169689" y="1233075"/>
             <a:ext cx="2293207" cy="484574"/>
             <a:chOff x="6220293" y="3785287"/>
             <a:chExt cx="2293207" cy="484574"/>
@@ -5283,7 +6088,7 @@
         </p:nvGrpSpPr>
         <p:grpSpPr>
           <a:xfrm>
-            <a:off x="231251" y="1795266"/>
+            <a:off x="45683" y="1391113"/>
             <a:ext cx="2293207" cy="484574"/>
             <a:chOff x="6220293" y="3785287"/>
             <a:chExt cx="2293207" cy="484574"/>
@@ -5743,8 +6548,8 @@
         </p:nvCxnSpPr>
         <p:spPr>
           <a:xfrm flipV="1">
-            <a:off x="2490482" y="2047649"/>
-            <a:ext cx="1090637" cy="15352"/>
+            <a:off x="2304914" y="1657202"/>
+            <a:ext cx="1083218" cy="1646"/>
           </a:xfrm>
           <a:prstGeom prst="line">
             <a:avLst/>
@@ -5784,13 +6589,13 @@
           <p:nvPr/>
         </p:nvCxnSpPr>
         <p:spPr>
-          <a:xfrm rot="10800000" flipV="1">
-            <a:off x="4801855" y="2364854"/>
-            <a:ext cx="1170384" cy="107389"/>
+          <a:xfrm rot="10800000">
+            <a:off x="5171766" y="1804483"/>
+            <a:ext cx="1083496" cy="183860"/>
           </a:xfrm>
           <a:prstGeom prst="bentConnector3">
             <a:avLst>
-              <a:gd name="adj1" fmla="val 49457"/>
+              <a:gd name="adj1" fmla="val 50000"/>
             </a:avLst>
           </a:prstGeom>
           <a:noFill/>
@@ -5819,7 +6624,7 @@
         </p:nvGrpSpPr>
         <p:grpSpPr>
           <a:xfrm>
-            <a:off x="5886975" y="2100711"/>
+            <a:off x="6169996" y="1724201"/>
             <a:ext cx="2469950" cy="484574"/>
             <a:chOff x="6220293" y="3785287"/>
             <a:chExt cx="2469950" cy="484574"/>
@@ -6276,7 +7081,7 @@
         </p:nvGrpSpPr>
         <p:grpSpPr>
           <a:xfrm>
-            <a:off x="265227" y="2455167"/>
+            <a:off x="45683" y="2037418"/>
             <a:ext cx="2293207" cy="484574"/>
             <a:chOff x="6220293" y="3785287"/>
             <a:chExt cx="2293207" cy="484574"/>
@@ -6735,9 +7540,9 @@
           <p:nvPr/>
         </p:nvCxnSpPr>
         <p:spPr>
-          <a:xfrm flipV="1">
-            <a:off x="2524458" y="2708020"/>
-            <a:ext cx="1057267" cy="14882"/>
+          <a:xfrm>
+            <a:off x="2304914" y="2305153"/>
+            <a:ext cx="1187586" cy="0"/>
           </a:xfrm>
           <a:prstGeom prst="line">
             <a:avLst/>
@@ -6773,13 +7578,14 @@
           </p:cNvPr>
           <p:cNvCxnSpPr>
             <a:cxnSpLocks/>
+            <a:stCxn id="63" idx="1"/>
           </p:cNvCxnSpPr>
           <p:nvPr/>
         </p:nvCxnSpPr>
         <p:spPr>
           <a:xfrm flipH="1">
-            <a:off x="4850683" y="3062189"/>
-            <a:ext cx="1141836" cy="0"/>
+            <a:off x="5171672" y="3087637"/>
+            <a:ext cx="1108924" cy="0"/>
           </a:xfrm>
           <a:prstGeom prst="line">
             <a:avLst/>
@@ -6818,7 +7624,7 @@
         </p:nvGrpSpPr>
         <p:grpSpPr>
           <a:xfrm>
-            <a:off x="5907255" y="2794454"/>
+            <a:off x="6195332" y="2819902"/>
             <a:ext cx="2293207" cy="484574"/>
             <a:chOff x="6220293" y="3785287"/>
             <a:chExt cx="2293207" cy="484574"/>
@@ -7275,7 +8081,7 @@
         </p:nvGrpSpPr>
         <p:grpSpPr>
           <a:xfrm>
-            <a:off x="264621" y="3832565"/>
+            <a:off x="78899" y="3875560"/>
             <a:ext cx="2506205" cy="484574"/>
             <a:chOff x="6220293" y="3785287"/>
             <a:chExt cx="2506205" cy="484574"/>
@@ -7734,9 +8540,9 @@
           <p:nvPr/>
         </p:nvCxnSpPr>
         <p:spPr>
-          <a:xfrm flipV="1">
-            <a:off x="2736850" y="4085418"/>
-            <a:ext cx="844269" cy="14882"/>
+          <a:xfrm>
+            <a:off x="2551128" y="4143295"/>
+            <a:ext cx="941372" cy="0"/>
           </a:xfrm>
           <a:prstGeom prst="line">
             <a:avLst/>
@@ -7772,13 +8578,14 @@
           </p:cNvPr>
           <p:cNvCxnSpPr>
             <a:cxnSpLocks/>
+            <a:stCxn id="75" idx="1"/>
           </p:cNvCxnSpPr>
           <p:nvPr/>
         </p:nvCxnSpPr>
         <p:spPr>
           <a:xfrm flipH="1">
-            <a:off x="4850077" y="4301215"/>
-            <a:ext cx="1141836" cy="0"/>
+            <a:off x="4876800" y="4314652"/>
+            <a:ext cx="1115719" cy="0"/>
           </a:xfrm>
           <a:prstGeom prst="line">
             <a:avLst/>
@@ -7817,7 +8624,7 @@
         </p:nvGrpSpPr>
         <p:grpSpPr>
           <a:xfrm>
-            <a:off x="5906649" y="4033480"/>
+            <a:off x="5907255" y="4046917"/>
             <a:ext cx="2293207" cy="484574"/>
             <a:chOff x="6220293" y="3785287"/>
             <a:chExt cx="2293207" cy="484574"/>
@@ -7935,6 +8742,920 @@
               <a:extLst>
                 <a:ext uri="{FF2B5EF4-FFF2-40B4-BE49-F238E27FC236}">
                   <a16:creationId xmlns:a16="http://schemas.microsoft.com/office/drawing/2014/main" id="{E0731D1A-732A-4783-B827-45A951A843E1}"/>
+                </a:ext>
+              </a:extLst>
+            </p:cNvPr>
+            <p:cNvSpPr/>
+            <p:nvPr/>
+          </p:nvSpPr>
+          <p:spPr>
+            <a:xfrm>
+              <a:off x="6220293" y="3785287"/>
+              <a:ext cx="350200" cy="348152"/>
+            </a:xfrm>
+            <a:custGeom>
+              <a:avLst/>
+              <a:gdLst/>
+              <a:ahLst/>
+              <a:cxnLst/>
+              <a:rect l="l" t="t" r="r" b="b"/>
+              <a:pathLst>
+                <a:path w="16756" h="16658" extrusionOk="0">
+                  <a:moveTo>
+                    <a:pt x="13287" y="2565"/>
+                  </a:moveTo>
+                  <a:lnTo>
+                    <a:pt x="13482" y="2590"/>
+                  </a:lnTo>
+                  <a:lnTo>
+                    <a:pt x="13653" y="2663"/>
+                  </a:lnTo>
+                  <a:lnTo>
+                    <a:pt x="13800" y="2736"/>
+                  </a:lnTo>
+                  <a:lnTo>
+                    <a:pt x="13922" y="2858"/>
+                  </a:lnTo>
+                  <a:lnTo>
+                    <a:pt x="14069" y="3005"/>
+                  </a:lnTo>
+                  <a:lnTo>
+                    <a:pt x="14142" y="3176"/>
+                  </a:lnTo>
+                  <a:lnTo>
+                    <a:pt x="14191" y="3371"/>
+                  </a:lnTo>
+                  <a:lnTo>
+                    <a:pt x="14215" y="3567"/>
+                  </a:lnTo>
+                  <a:lnTo>
+                    <a:pt x="14191" y="3738"/>
+                  </a:lnTo>
+                  <a:lnTo>
+                    <a:pt x="14142" y="3884"/>
+                  </a:lnTo>
+                  <a:lnTo>
+                    <a:pt x="14069" y="4055"/>
+                  </a:lnTo>
+                  <a:lnTo>
+                    <a:pt x="13922" y="4202"/>
+                  </a:lnTo>
+                  <a:lnTo>
+                    <a:pt x="13800" y="4348"/>
+                  </a:lnTo>
+                  <a:lnTo>
+                    <a:pt x="13653" y="4446"/>
+                  </a:lnTo>
+                  <a:lnTo>
+                    <a:pt x="13482" y="4495"/>
+                  </a:lnTo>
+                  <a:lnTo>
+                    <a:pt x="13067" y="4495"/>
+                  </a:lnTo>
+                  <a:lnTo>
+                    <a:pt x="12896" y="4446"/>
+                  </a:lnTo>
+                  <a:lnTo>
+                    <a:pt x="12725" y="4348"/>
+                  </a:lnTo>
+                  <a:lnTo>
+                    <a:pt x="12554" y="4202"/>
+                  </a:lnTo>
+                  <a:lnTo>
+                    <a:pt x="12481" y="4055"/>
+                  </a:lnTo>
+                  <a:lnTo>
+                    <a:pt x="12408" y="3884"/>
+                  </a:lnTo>
+                  <a:lnTo>
+                    <a:pt x="12359" y="3738"/>
+                  </a:lnTo>
+                  <a:lnTo>
+                    <a:pt x="12359" y="3567"/>
+                  </a:lnTo>
+                  <a:lnTo>
+                    <a:pt x="12359" y="3371"/>
+                  </a:lnTo>
+                  <a:lnTo>
+                    <a:pt x="12408" y="3176"/>
+                  </a:lnTo>
+                  <a:lnTo>
+                    <a:pt x="12481" y="3005"/>
+                  </a:lnTo>
+                  <a:lnTo>
+                    <a:pt x="12554" y="2858"/>
+                  </a:lnTo>
+                  <a:lnTo>
+                    <a:pt x="12725" y="2736"/>
+                  </a:lnTo>
+                  <a:lnTo>
+                    <a:pt x="12896" y="2663"/>
+                  </a:lnTo>
+                  <a:lnTo>
+                    <a:pt x="13067" y="2590"/>
+                  </a:lnTo>
+                  <a:lnTo>
+                    <a:pt x="13287" y="2565"/>
+                  </a:lnTo>
+                  <a:close/>
+                  <a:moveTo>
+                    <a:pt x="10845" y="1"/>
+                  </a:moveTo>
+                  <a:lnTo>
+                    <a:pt x="10527" y="25"/>
+                  </a:lnTo>
+                  <a:lnTo>
+                    <a:pt x="10210" y="74"/>
+                  </a:lnTo>
+                  <a:lnTo>
+                    <a:pt x="9868" y="172"/>
+                  </a:lnTo>
+                  <a:lnTo>
+                    <a:pt x="9477" y="318"/>
+                  </a:lnTo>
+                  <a:lnTo>
+                    <a:pt x="9184" y="489"/>
+                  </a:lnTo>
+                  <a:lnTo>
+                    <a:pt x="8891" y="660"/>
+                  </a:lnTo>
+                  <a:lnTo>
+                    <a:pt x="8622" y="831"/>
+                  </a:lnTo>
+                  <a:lnTo>
+                    <a:pt x="8525" y="953"/>
+                  </a:lnTo>
+                  <a:lnTo>
+                    <a:pt x="8427" y="1051"/>
+                  </a:lnTo>
+                  <a:lnTo>
+                    <a:pt x="416" y="8866"/>
+                  </a:lnTo>
+                  <a:lnTo>
+                    <a:pt x="270" y="9086"/>
+                  </a:lnTo>
+                  <a:lnTo>
+                    <a:pt x="123" y="9355"/>
+                  </a:lnTo>
+                  <a:lnTo>
+                    <a:pt x="25" y="9624"/>
+                  </a:lnTo>
+                  <a:lnTo>
+                    <a:pt x="1" y="9746"/>
+                  </a:lnTo>
+                  <a:lnTo>
+                    <a:pt x="1" y="9917"/>
+                  </a:lnTo>
+                  <a:lnTo>
+                    <a:pt x="1" y="10039"/>
+                  </a:lnTo>
+                  <a:lnTo>
+                    <a:pt x="25" y="10136"/>
+                  </a:lnTo>
+                  <a:lnTo>
+                    <a:pt x="123" y="10381"/>
+                  </a:lnTo>
+                  <a:lnTo>
+                    <a:pt x="270" y="10625"/>
+                  </a:lnTo>
+                  <a:lnTo>
+                    <a:pt x="416" y="10869"/>
+                  </a:lnTo>
+                  <a:lnTo>
+                    <a:pt x="5911" y="16242"/>
+                  </a:lnTo>
+                  <a:lnTo>
+                    <a:pt x="6009" y="16340"/>
+                  </a:lnTo>
+                  <a:lnTo>
+                    <a:pt x="6131" y="16438"/>
+                  </a:lnTo>
+                  <a:lnTo>
+                    <a:pt x="6253" y="16511"/>
+                  </a:lnTo>
+                  <a:lnTo>
+                    <a:pt x="6400" y="16560"/>
+                  </a:lnTo>
+                  <a:lnTo>
+                    <a:pt x="6522" y="16609"/>
+                  </a:lnTo>
+                  <a:lnTo>
+                    <a:pt x="6668" y="16633"/>
+                  </a:lnTo>
+                  <a:lnTo>
+                    <a:pt x="6961" y="16657"/>
+                  </a:lnTo>
+                  <a:lnTo>
+                    <a:pt x="7206" y="16633"/>
+                  </a:lnTo>
+                  <a:lnTo>
+                    <a:pt x="7474" y="16560"/>
+                  </a:lnTo>
+                  <a:lnTo>
+                    <a:pt x="7596" y="16511"/>
+                  </a:lnTo>
+                  <a:lnTo>
+                    <a:pt x="7719" y="16438"/>
+                  </a:lnTo>
+                  <a:lnTo>
+                    <a:pt x="7816" y="16340"/>
+                  </a:lnTo>
+                  <a:lnTo>
+                    <a:pt x="7914" y="16242"/>
+                  </a:lnTo>
+                  <a:lnTo>
+                    <a:pt x="15803" y="8427"/>
+                  </a:lnTo>
+                  <a:lnTo>
+                    <a:pt x="15974" y="8183"/>
+                  </a:lnTo>
+                  <a:lnTo>
+                    <a:pt x="16169" y="7938"/>
+                  </a:lnTo>
+                  <a:lnTo>
+                    <a:pt x="16242" y="7792"/>
+                  </a:lnTo>
+                  <a:lnTo>
+                    <a:pt x="16340" y="7645"/>
+                  </a:lnTo>
+                  <a:lnTo>
+                    <a:pt x="16389" y="7474"/>
+                  </a:lnTo>
+                  <a:lnTo>
+                    <a:pt x="16438" y="7279"/>
+                  </a:lnTo>
+                  <a:lnTo>
+                    <a:pt x="16584" y="6961"/>
+                  </a:lnTo>
+                  <a:lnTo>
+                    <a:pt x="16682" y="6644"/>
+                  </a:lnTo>
+                  <a:lnTo>
+                    <a:pt x="16731" y="6326"/>
+                  </a:lnTo>
+                  <a:lnTo>
+                    <a:pt x="16755" y="6009"/>
+                  </a:lnTo>
+                  <a:lnTo>
+                    <a:pt x="16755" y="1491"/>
+                  </a:lnTo>
+                  <a:lnTo>
+                    <a:pt x="16731" y="1173"/>
+                  </a:lnTo>
+                  <a:lnTo>
+                    <a:pt x="16706" y="1051"/>
+                  </a:lnTo>
+                  <a:lnTo>
+                    <a:pt x="16657" y="905"/>
+                  </a:lnTo>
+                  <a:lnTo>
+                    <a:pt x="16609" y="782"/>
+                  </a:lnTo>
+                  <a:lnTo>
+                    <a:pt x="16535" y="660"/>
+                  </a:lnTo>
+                  <a:lnTo>
+                    <a:pt x="16438" y="538"/>
+                  </a:lnTo>
+                  <a:lnTo>
+                    <a:pt x="16340" y="416"/>
+                  </a:lnTo>
+                  <a:lnTo>
+                    <a:pt x="16144" y="270"/>
+                  </a:lnTo>
+                  <a:lnTo>
+                    <a:pt x="15900" y="123"/>
+                  </a:lnTo>
+                  <a:lnTo>
+                    <a:pt x="15632" y="50"/>
+                  </a:lnTo>
+                  <a:lnTo>
+                    <a:pt x="15509" y="1"/>
+                  </a:lnTo>
+                  <a:close/>
+                </a:path>
+              </a:pathLst>
+            </a:custGeom>
+            <a:solidFill>
+              <a:srgbClr val="FFC000"/>
+            </a:solidFill>
+            <a:ln>
+              <a:noFill/>
+            </a:ln>
+          </p:spPr>
+          <p:txBody>
+            <a:bodyPr spcFirstLastPara="1" wrap="square" lIns="91425" tIns="91425" rIns="91425" bIns="91425" anchor="ctr" anchorCtr="0">
+              <a:noAutofit/>
+            </a:bodyPr>
+            <a:lstStyle/>
+            <a:p>
+              <a:pPr marL="0" lvl="0" indent="0" algn="l" rtl="0">
+                <a:spcBef>
+                  <a:spcPts val="0"/>
+                </a:spcBef>
+                <a:spcAft>
+                  <a:spcPts val="0"/>
+                </a:spcAft>
+                <a:buNone/>
+              </a:pPr>
+              <a:endParaRPr>
+                <a:solidFill>
+                  <a:schemeClr val="dk1"/>
+                </a:solidFill>
+              </a:endParaRPr>
+            </a:p>
+          </p:txBody>
+        </p:sp>
+      </p:grpSp>
+      <p:grpSp>
+        <p:nvGrpSpPr>
+          <p:cNvPr id="70" name="群組 69">
+            <a:extLst>
+              <a:ext uri="{FF2B5EF4-FFF2-40B4-BE49-F238E27FC236}">
+                <a16:creationId xmlns:a16="http://schemas.microsoft.com/office/drawing/2014/main" id="{496545D4-7F34-409A-906C-8658976182B0}"/>
+              </a:ext>
+            </a:extLst>
+          </p:cNvPr>
+          <p:cNvGrpSpPr/>
+          <p:nvPr/>
+        </p:nvGrpSpPr>
+        <p:grpSpPr>
+          <a:xfrm>
+            <a:off x="6169689" y="2240772"/>
+            <a:ext cx="2881791" cy="484574"/>
+            <a:chOff x="6220293" y="3785287"/>
+            <a:chExt cx="2881791" cy="484574"/>
+          </a:xfrm>
+        </p:grpSpPr>
+        <p:sp>
+          <p:nvSpPr>
+            <p:cNvPr id="71" name="Google Shape;753;p20">
+              <a:extLst>
+                <a:ext uri="{FF2B5EF4-FFF2-40B4-BE49-F238E27FC236}">
+                  <a16:creationId xmlns:a16="http://schemas.microsoft.com/office/drawing/2014/main" id="{7331CBF2-F069-4398-96FE-6C55B02E4187}"/>
+                </a:ext>
+              </a:extLst>
+            </p:cNvPr>
+            <p:cNvSpPr/>
+            <p:nvPr/>
+          </p:nvSpPr>
+          <p:spPr>
+            <a:xfrm>
+              <a:off x="6339533" y="3927148"/>
+              <a:ext cx="2762551" cy="342713"/>
+            </a:xfrm>
+            <a:prstGeom prst="roundRect">
+              <a:avLst>
+                <a:gd name="adj" fmla="val 16667"/>
+              </a:avLst>
+            </a:prstGeom>
+            <a:solidFill>
+              <a:schemeClr val="bg1">
+                <a:lumMod val="75000"/>
+              </a:schemeClr>
+            </a:solidFill>
+            <a:ln>
+              <a:noFill/>
+            </a:ln>
+          </p:spPr>
+          <p:txBody>
+            <a:bodyPr spcFirstLastPara="1" wrap="square" lIns="91425" tIns="91425" rIns="91425" bIns="91425" anchor="ctr" anchorCtr="0">
+              <a:noAutofit/>
+            </a:bodyPr>
+            <a:lstStyle/>
+            <a:p>
+              <a:endParaRPr sz="1200" dirty="0">
+                <a:solidFill>
+                  <a:schemeClr val="lt1"/>
+                </a:solidFill>
+                <a:latin typeface="+mn-ea"/>
+                <a:ea typeface="+mn-ea"/>
+                <a:sym typeface="Barlow"/>
+              </a:endParaRPr>
+            </a:p>
+          </p:txBody>
+        </p:sp>
+        <p:sp>
+          <p:nvSpPr>
+            <p:cNvPr id="77" name="Google Shape;753;p20">
+              <a:extLst>
+                <a:ext uri="{FF2B5EF4-FFF2-40B4-BE49-F238E27FC236}">
+                  <a16:creationId xmlns:a16="http://schemas.microsoft.com/office/drawing/2014/main" id="{DAEA7960-7635-4BC1-84C4-5D51692DDD6A}"/>
+                </a:ext>
+              </a:extLst>
+            </p:cNvPr>
+            <p:cNvSpPr/>
+            <p:nvPr/>
+          </p:nvSpPr>
+          <p:spPr>
+            <a:xfrm>
+              <a:off x="6305557" y="3881665"/>
+              <a:ext cx="2762551" cy="342714"/>
+            </a:xfrm>
+            <a:prstGeom prst="roundRect">
+              <a:avLst>
+                <a:gd name="adj" fmla="val 16667"/>
+              </a:avLst>
+            </a:prstGeom>
+            <a:solidFill>
+              <a:srgbClr val="2683C6"/>
+            </a:solidFill>
+            <a:ln>
+              <a:noFill/>
+            </a:ln>
+          </p:spPr>
+          <p:txBody>
+            <a:bodyPr spcFirstLastPara="1" wrap="square" lIns="91425" tIns="91425" rIns="91425" bIns="91425" anchor="ctr" anchorCtr="0">
+              <a:noAutofit/>
+            </a:bodyPr>
+            <a:lstStyle/>
+            <a:p>
+              <a:pPr lvl="0" algn="ctr"/>
+              <a:r>
+                <a:rPr lang="zh-TW" altLang="en-US" sz="1600" b="1" dirty="0">
+                  <a:solidFill>
+                    <a:schemeClr val="bg1"/>
+                  </a:solidFill>
+                  <a:latin typeface="Chiron Sans HK Pro Heavy"/>
+                  <a:ea typeface="Chiron Sans HK Pro Heavy"/>
+                  <a:sym typeface="Barlow"/>
+                </a:rPr>
+                <a:t>跳到下一張未標註的影像</a:t>
+              </a:r>
+              <a:endParaRPr lang="zh-TW" altLang="en-US" sz="1500" b="1" dirty="0">
+                <a:solidFill>
+                  <a:schemeClr val="bg1"/>
+                </a:solidFill>
+                <a:latin typeface="Chiron Sans HK Pro Heavy"/>
+                <a:ea typeface="Chiron Sans HK Pro Heavy"/>
+                <a:sym typeface="Barlow"/>
+              </a:endParaRPr>
+            </a:p>
+          </p:txBody>
+        </p:sp>
+        <p:sp>
+          <p:nvSpPr>
+            <p:cNvPr id="78" name="Google Shape;757;p20">
+              <a:extLst>
+                <a:ext uri="{FF2B5EF4-FFF2-40B4-BE49-F238E27FC236}">
+                  <a16:creationId xmlns:a16="http://schemas.microsoft.com/office/drawing/2014/main" id="{F38AC6C9-0EE9-492C-8535-E6B8A2862207}"/>
+                </a:ext>
+              </a:extLst>
+            </p:cNvPr>
+            <p:cNvSpPr/>
+            <p:nvPr/>
+          </p:nvSpPr>
+          <p:spPr>
+            <a:xfrm>
+              <a:off x="6220293" y="3785287"/>
+              <a:ext cx="350200" cy="348152"/>
+            </a:xfrm>
+            <a:custGeom>
+              <a:avLst/>
+              <a:gdLst/>
+              <a:ahLst/>
+              <a:cxnLst/>
+              <a:rect l="l" t="t" r="r" b="b"/>
+              <a:pathLst>
+                <a:path w="16756" h="16658" extrusionOk="0">
+                  <a:moveTo>
+                    <a:pt x="13287" y="2565"/>
+                  </a:moveTo>
+                  <a:lnTo>
+                    <a:pt x="13482" y="2590"/>
+                  </a:lnTo>
+                  <a:lnTo>
+                    <a:pt x="13653" y="2663"/>
+                  </a:lnTo>
+                  <a:lnTo>
+                    <a:pt x="13800" y="2736"/>
+                  </a:lnTo>
+                  <a:lnTo>
+                    <a:pt x="13922" y="2858"/>
+                  </a:lnTo>
+                  <a:lnTo>
+                    <a:pt x="14069" y="3005"/>
+                  </a:lnTo>
+                  <a:lnTo>
+                    <a:pt x="14142" y="3176"/>
+                  </a:lnTo>
+                  <a:lnTo>
+                    <a:pt x="14191" y="3371"/>
+                  </a:lnTo>
+                  <a:lnTo>
+                    <a:pt x="14215" y="3567"/>
+                  </a:lnTo>
+                  <a:lnTo>
+                    <a:pt x="14191" y="3738"/>
+                  </a:lnTo>
+                  <a:lnTo>
+                    <a:pt x="14142" y="3884"/>
+                  </a:lnTo>
+                  <a:lnTo>
+                    <a:pt x="14069" y="4055"/>
+                  </a:lnTo>
+                  <a:lnTo>
+                    <a:pt x="13922" y="4202"/>
+                  </a:lnTo>
+                  <a:lnTo>
+                    <a:pt x="13800" y="4348"/>
+                  </a:lnTo>
+                  <a:lnTo>
+                    <a:pt x="13653" y="4446"/>
+                  </a:lnTo>
+                  <a:lnTo>
+                    <a:pt x="13482" y="4495"/>
+                  </a:lnTo>
+                  <a:lnTo>
+                    <a:pt x="13067" y="4495"/>
+                  </a:lnTo>
+                  <a:lnTo>
+                    <a:pt x="12896" y="4446"/>
+                  </a:lnTo>
+                  <a:lnTo>
+                    <a:pt x="12725" y="4348"/>
+                  </a:lnTo>
+                  <a:lnTo>
+                    <a:pt x="12554" y="4202"/>
+                  </a:lnTo>
+                  <a:lnTo>
+                    <a:pt x="12481" y="4055"/>
+                  </a:lnTo>
+                  <a:lnTo>
+                    <a:pt x="12408" y="3884"/>
+                  </a:lnTo>
+                  <a:lnTo>
+                    <a:pt x="12359" y="3738"/>
+                  </a:lnTo>
+                  <a:lnTo>
+                    <a:pt x="12359" y="3567"/>
+                  </a:lnTo>
+                  <a:lnTo>
+                    <a:pt x="12359" y="3371"/>
+                  </a:lnTo>
+                  <a:lnTo>
+                    <a:pt x="12408" y="3176"/>
+                  </a:lnTo>
+                  <a:lnTo>
+                    <a:pt x="12481" y="3005"/>
+                  </a:lnTo>
+                  <a:lnTo>
+                    <a:pt x="12554" y="2858"/>
+                  </a:lnTo>
+                  <a:lnTo>
+                    <a:pt x="12725" y="2736"/>
+                  </a:lnTo>
+                  <a:lnTo>
+                    <a:pt x="12896" y="2663"/>
+                  </a:lnTo>
+                  <a:lnTo>
+                    <a:pt x="13067" y="2590"/>
+                  </a:lnTo>
+                  <a:lnTo>
+                    <a:pt x="13287" y="2565"/>
+                  </a:lnTo>
+                  <a:close/>
+                  <a:moveTo>
+                    <a:pt x="10845" y="1"/>
+                  </a:moveTo>
+                  <a:lnTo>
+                    <a:pt x="10527" y="25"/>
+                  </a:lnTo>
+                  <a:lnTo>
+                    <a:pt x="10210" y="74"/>
+                  </a:lnTo>
+                  <a:lnTo>
+                    <a:pt x="9868" y="172"/>
+                  </a:lnTo>
+                  <a:lnTo>
+                    <a:pt x="9477" y="318"/>
+                  </a:lnTo>
+                  <a:lnTo>
+                    <a:pt x="9184" y="489"/>
+                  </a:lnTo>
+                  <a:lnTo>
+                    <a:pt x="8891" y="660"/>
+                  </a:lnTo>
+                  <a:lnTo>
+                    <a:pt x="8622" y="831"/>
+                  </a:lnTo>
+                  <a:lnTo>
+                    <a:pt x="8525" y="953"/>
+                  </a:lnTo>
+                  <a:lnTo>
+                    <a:pt x="8427" y="1051"/>
+                  </a:lnTo>
+                  <a:lnTo>
+                    <a:pt x="416" y="8866"/>
+                  </a:lnTo>
+                  <a:lnTo>
+                    <a:pt x="270" y="9086"/>
+                  </a:lnTo>
+                  <a:lnTo>
+                    <a:pt x="123" y="9355"/>
+                  </a:lnTo>
+                  <a:lnTo>
+                    <a:pt x="25" y="9624"/>
+                  </a:lnTo>
+                  <a:lnTo>
+                    <a:pt x="1" y="9746"/>
+                  </a:lnTo>
+                  <a:lnTo>
+                    <a:pt x="1" y="9917"/>
+                  </a:lnTo>
+                  <a:lnTo>
+                    <a:pt x="1" y="10039"/>
+                  </a:lnTo>
+                  <a:lnTo>
+                    <a:pt x="25" y="10136"/>
+                  </a:lnTo>
+                  <a:lnTo>
+                    <a:pt x="123" y="10381"/>
+                  </a:lnTo>
+                  <a:lnTo>
+                    <a:pt x="270" y="10625"/>
+                  </a:lnTo>
+                  <a:lnTo>
+                    <a:pt x="416" y="10869"/>
+                  </a:lnTo>
+                  <a:lnTo>
+                    <a:pt x="5911" y="16242"/>
+                  </a:lnTo>
+                  <a:lnTo>
+                    <a:pt x="6009" y="16340"/>
+                  </a:lnTo>
+                  <a:lnTo>
+                    <a:pt x="6131" y="16438"/>
+                  </a:lnTo>
+                  <a:lnTo>
+                    <a:pt x="6253" y="16511"/>
+                  </a:lnTo>
+                  <a:lnTo>
+                    <a:pt x="6400" y="16560"/>
+                  </a:lnTo>
+                  <a:lnTo>
+                    <a:pt x="6522" y="16609"/>
+                  </a:lnTo>
+                  <a:lnTo>
+                    <a:pt x="6668" y="16633"/>
+                  </a:lnTo>
+                  <a:lnTo>
+                    <a:pt x="6961" y="16657"/>
+                  </a:lnTo>
+                  <a:lnTo>
+                    <a:pt x="7206" y="16633"/>
+                  </a:lnTo>
+                  <a:lnTo>
+                    <a:pt x="7474" y="16560"/>
+                  </a:lnTo>
+                  <a:lnTo>
+                    <a:pt x="7596" y="16511"/>
+                  </a:lnTo>
+                  <a:lnTo>
+                    <a:pt x="7719" y="16438"/>
+                  </a:lnTo>
+                  <a:lnTo>
+                    <a:pt x="7816" y="16340"/>
+                  </a:lnTo>
+                  <a:lnTo>
+                    <a:pt x="7914" y="16242"/>
+                  </a:lnTo>
+                  <a:lnTo>
+                    <a:pt x="15803" y="8427"/>
+                  </a:lnTo>
+                  <a:lnTo>
+                    <a:pt x="15974" y="8183"/>
+                  </a:lnTo>
+                  <a:lnTo>
+                    <a:pt x="16169" y="7938"/>
+                  </a:lnTo>
+                  <a:lnTo>
+                    <a:pt x="16242" y="7792"/>
+                  </a:lnTo>
+                  <a:lnTo>
+                    <a:pt x="16340" y="7645"/>
+                  </a:lnTo>
+                  <a:lnTo>
+                    <a:pt x="16389" y="7474"/>
+                  </a:lnTo>
+                  <a:lnTo>
+                    <a:pt x="16438" y="7279"/>
+                  </a:lnTo>
+                  <a:lnTo>
+                    <a:pt x="16584" y="6961"/>
+                  </a:lnTo>
+                  <a:lnTo>
+                    <a:pt x="16682" y="6644"/>
+                  </a:lnTo>
+                  <a:lnTo>
+                    <a:pt x="16731" y="6326"/>
+                  </a:lnTo>
+                  <a:lnTo>
+                    <a:pt x="16755" y="6009"/>
+                  </a:lnTo>
+                  <a:lnTo>
+                    <a:pt x="16755" y="1491"/>
+                  </a:lnTo>
+                  <a:lnTo>
+                    <a:pt x="16731" y="1173"/>
+                  </a:lnTo>
+                  <a:lnTo>
+                    <a:pt x="16706" y="1051"/>
+                  </a:lnTo>
+                  <a:lnTo>
+                    <a:pt x="16657" y="905"/>
+                  </a:lnTo>
+                  <a:lnTo>
+                    <a:pt x="16609" y="782"/>
+                  </a:lnTo>
+                  <a:lnTo>
+                    <a:pt x="16535" y="660"/>
+                  </a:lnTo>
+                  <a:lnTo>
+                    <a:pt x="16438" y="538"/>
+                  </a:lnTo>
+                  <a:lnTo>
+                    <a:pt x="16340" y="416"/>
+                  </a:lnTo>
+                  <a:lnTo>
+                    <a:pt x="16144" y="270"/>
+                  </a:lnTo>
+                  <a:lnTo>
+                    <a:pt x="15900" y="123"/>
+                  </a:lnTo>
+                  <a:lnTo>
+                    <a:pt x="15632" y="50"/>
+                  </a:lnTo>
+                  <a:lnTo>
+                    <a:pt x="15509" y="1"/>
+                  </a:lnTo>
+                  <a:close/>
+                </a:path>
+              </a:pathLst>
+            </a:custGeom>
+            <a:solidFill>
+              <a:srgbClr val="FFC000"/>
+            </a:solidFill>
+            <a:ln>
+              <a:noFill/>
+            </a:ln>
+          </p:spPr>
+          <p:txBody>
+            <a:bodyPr spcFirstLastPara="1" wrap="square" lIns="91425" tIns="91425" rIns="91425" bIns="91425" anchor="ctr" anchorCtr="0">
+              <a:noAutofit/>
+            </a:bodyPr>
+            <a:lstStyle/>
+            <a:p>
+              <a:pPr marL="0" lvl="0" indent="0" algn="l" rtl="0">
+                <a:spcBef>
+                  <a:spcPts val="0"/>
+                </a:spcBef>
+                <a:spcAft>
+                  <a:spcPts val="0"/>
+                </a:spcAft>
+                <a:buNone/>
+              </a:pPr>
+              <a:endParaRPr>
+                <a:solidFill>
+                  <a:schemeClr val="dk1"/>
+                </a:solidFill>
+              </a:endParaRPr>
+            </a:p>
+          </p:txBody>
+        </p:sp>
+      </p:grpSp>
+      <p:grpSp>
+        <p:nvGrpSpPr>
+          <p:cNvPr id="80" name="群組 79">
+            <a:extLst>
+              <a:ext uri="{FF2B5EF4-FFF2-40B4-BE49-F238E27FC236}">
+                <a16:creationId xmlns:a16="http://schemas.microsoft.com/office/drawing/2014/main" id="{2CCABCED-4574-4111-A566-329212BA7923}"/>
+              </a:ext>
+            </a:extLst>
+          </p:cNvPr>
+          <p:cNvGrpSpPr/>
+          <p:nvPr/>
+        </p:nvGrpSpPr>
+        <p:grpSpPr>
+          <a:xfrm>
+            <a:off x="5713313" y="4603440"/>
+            <a:ext cx="2881791" cy="484574"/>
+            <a:chOff x="6220293" y="3785287"/>
+            <a:chExt cx="2881791" cy="484574"/>
+          </a:xfrm>
+        </p:grpSpPr>
+        <p:sp>
+          <p:nvSpPr>
+            <p:cNvPr id="81" name="Google Shape;753;p20">
+              <a:extLst>
+                <a:ext uri="{FF2B5EF4-FFF2-40B4-BE49-F238E27FC236}">
+                  <a16:creationId xmlns:a16="http://schemas.microsoft.com/office/drawing/2014/main" id="{4A18F831-F481-4A87-913F-82553C5ED0C3}"/>
+                </a:ext>
+              </a:extLst>
+            </p:cNvPr>
+            <p:cNvSpPr/>
+            <p:nvPr/>
+          </p:nvSpPr>
+          <p:spPr>
+            <a:xfrm>
+              <a:off x="6339533" y="3927148"/>
+              <a:ext cx="2762551" cy="342713"/>
+            </a:xfrm>
+            <a:prstGeom prst="roundRect">
+              <a:avLst>
+                <a:gd name="adj" fmla="val 16667"/>
+              </a:avLst>
+            </a:prstGeom>
+            <a:solidFill>
+              <a:schemeClr val="bg1">
+                <a:lumMod val="75000"/>
+              </a:schemeClr>
+            </a:solidFill>
+            <a:ln>
+              <a:noFill/>
+            </a:ln>
+          </p:spPr>
+          <p:txBody>
+            <a:bodyPr spcFirstLastPara="1" wrap="square" lIns="91425" tIns="91425" rIns="91425" bIns="91425" anchor="ctr" anchorCtr="0">
+              <a:noAutofit/>
+            </a:bodyPr>
+            <a:lstStyle/>
+            <a:p>
+              <a:endParaRPr sz="1200" dirty="0">
+                <a:solidFill>
+                  <a:schemeClr val="lt1"/>
+                </a:solidFill>
+                <a:latin typeface="+mn-ea"/>
+                <a:ea typeface="+mn-ea"/>
+                <a:sym typeface="Barlow"/>
+              </a:endParaRPr>
+            </a:p>
+          </p:txBody>
+        </p:sp>
+        <p:sp>
+          <p:nvSpPr>
+            <p:cNvPr id="82" name="Google Shape;753;p20">
+              <a:extLst>
+                <a:ext uri="{FF2B5EF4-FFF2-40B4-BE49-F238E27FC236}">
+                  <a16:creationId xmlns:a16="http://schemas.microsoft.com/office/drawing/2014/main" id="{6E2AB8F6-D6D0-462E-8430-7977780A4E8D}"/>
+                </a:ext>
+              </a:extLst>
+            </p:cNvPr>
+            <p:cNvSpPr/>
+            <p:nvPr/>
+          </p:nvSpPr>
+          <p:spPr>
+            <a:xfrm>
+              <a:off x="6305557" y="3881665"/>
+              <a:ext cx="2762551" cy="342714"/>
+            </a:xfrm>
+            <a:prstGeom prst="roundRect">
+              <a:avLst>
+                <a:gd name="adj" fmla="val 16667"/>
+              </a:avLst>
+            </a:prstGeom>
+            <a:solidFill>
+              <a:srgbClr val="2683C6"/>
+            </a:solidFill>
+            <a:ln>
+              <a:noFill/>
+            </a:ln>
+          </p:spPr>
+          <p:txBody>
+            <a:bodyPr spcFirstLastPara="1" wrap="square" lIns="91425" tIns="91425" rIns="91425" bIns="91425" anchor="ctr" anchorCtr="0">
+              <a:noAutofit/>
+            </a:bodyPr>
+            <a:lstStyle/>
+            <a:p>
+              <a:pPr lvl="0" algn="ctr"/>
+              <a:r>
+                <a:rPr lang="zh-TW" altLang="en-US" sz="1600" b="1" dirty="0">
+                  <a:solidFill>
+                    <a:schemeClr val="bg1"/>
+                  </a:solidFill>
+                  <a:latin typeface="Chiron Sans HK Pro Heavy"/>
+                  <a:ea typeface="Chiron Sans HK Pro Heavy"/>
+                  <a:sym typeface="Barlow"/>
+                </a:rPr>
+                <a:t>標註左髖與右髖的區域</a:t>
+              </a:r>
+              <a:endParaRPr lang="zh-TW" altLang="en-US" sz="1500" b="1" dirty="0">
+                <a:solidFill>
+                  <a:schemeClr val="bg1"/>
+                </a:solidFill>
+                <a:latin typeface="Chiron Sans HK Pro Heavy"/>
+                <a:ea typeface="Chiron Sans HK Pro Heavy"/>
+                <a:sym typeface="Barlow"/>
+              </a:endParaRPr>
+            </a:p>
+          </p:txBody>
+        </p:sp>
+        <p:sp>
+          <p:nvSpPr>
+            <p:cNvPr id="83" name="Google Shape;757;p20">
+              <a:extLst>
+                <a:ext uri="{FF2B5EF4-FFF2-40B4-BE49-F238E27FC236}">
+                  <a16:creationId xmlns:a16="http://schemas.microsoft.com/office/drawing/2014/main" id="{143DE093-2E90-4DB1-8993-FD7CB91220F3}"/>
                 </a:ext>
               </a:extLst>
             </p:cNvPr>

</xml_diff>